<commit_message>
Intro not so damn loud
</commit_message>
<xml_diff>
--- a/media/ThumbnailTemplate.pptx
+++ b/media/ThumbnailTemplate.pptx
@@ -5,11 +5,10 @@
     <p:sldMasterId id="2147483648" r:id="rId1"/>
   </p:sldMasterIdLst>
   <p:handoutMasterIdLst>
-    <p:handoutMasterId r:id="rId4"/>
+    <p:handoutMasterId r:id="rId3"/>
   </p:handoutMasterIdLst>
   <p:sldIdLst>
-    <p:sldId id="256" r:id="rId2"/>
-    <p:sldId id="257" r:id="rId3"/>
+    <p:sldId id="257" r:id="rId2"/>
   </p:sldIdLst>
   <p:sldSz cx="12192000" cy="6858000"/>
   <p:notesSz cx="6858000" cy="9144000"/>
@@ -112,6 +111,9 @@
     <p:ext uri="{EFAFB233-063F-42B5-8137-9DF3F51BA10A}">
       <p15:sldGuideLst xmlns:p15="http://schemas.microsoft.com/office/powerpoint/2012/main"/>
     </p:ext>
+    <p:ext uri="{2D200454-40CA-4A62-9FC3-DE9A4176ACB9}">
+      <p15:notesGuideLst xmlns:p15="http://schemas.microsoft.com/office/powerpoint/2012/main"/>
+    </p:ext>
   </p:extLst>
 </p:presentation>
 </file>
@@ -210,7 +212,7 @@
           <a:p>
             <a:fld id="{BE85871F-E2CB-4745-95F9-C2CF77613C12}" type="datetimeFigureOut">
               <a:rPr lang="en-US" smtClean="0"/>
-              <a:t>1/25/2020</a:t>
+              <a:t>3/23/2020</a:t>
             </a:fld>
             <a:endParaRPr lang="en-US"/>
           </a:p>
@@ -452,7 +454,7 @@
           <a:p>
             <a:fld id="{59C95A8B-8514-44D8-B6AF-C67D600D4544}" type="datetimeFigureOut">
               <a:rPr lang="en-US" smtClean="0"/>
-              <a:t>1/25/2020</a:t>
+              <a:t>3/23/2020</a:t>
             </a:fld>
             <a:endParaRPr lang="en-US"/>
           </a:p>
@@ -650,7 +652,7 @@
           <a:p>
             <a:fld id="{59C95A8B-8514-44D8-B6AF-C67D600D4544}" type="datetimeFigureOut">
               <a:rPr lang="en-US" smtClean="0"/>
-              <a:t>1/25/2020</a:t>
+              <a:t>3/23/2020</a:t>
             </a:fld>
             <a:endParaRPr lang="en-US"/>
           </a:p>
@@ -858,7 +860,7 @@
           <a:p>
             <a:fld id="{59C95A8B-8514-44D8-B6AF-C67D600D4544}" type="datetimeFigureOut">
               <a:rPr lang="en-US" smtClean="0"/>
-              <a:t>1/25/2020</a:t>
+              <a:t>3/23/2020</a:t>
             </a:fld>
             <a:endParaRPr lang="en-US"/>
           </a:p>
@@ -1056,7 +1058,7 @@
           <a:p>
             <a:fld id="{59C95A8B-8514-44D8-B6AF-C67D600D4544}" type="datetimeFigureOut">
               <a:rPr lang="en-US" smtClean="0"/>
-              <a:t>1/25/2020</a:t>
+              <a:t>3/23/2020</a:t>
             </a:fld>
             <a:endParaRPr lang="en-US"/>
           </a:p>
@@ -1331,7 +1333,7 @@
           <a:p>
             <a:fld id="{59C95A8B-8514-44D8-B6AF-C67D600D4544}" type="datetimeFigureOut">
               <a:rPr lang="en-US" smtClean="0"/>
-              <a:t>1/25/2020</a:t>
+              <a:t>3/23/2020</a:t>
             </a:fld>
             <a:endParaRPr lang="en-US"/>
           </a:p>
@@ -1596,7 +1598,7 @@
           <a:p>
             <a:fld id="{59C95A8B-8514-44D8-B6AF-C67D600D4544}" type="datetimeFigureOut">
               <a:rPr lang="en-US" smtClean="0"/>
-              <a:t>1/25/2020</a:t>
+              <a:t>3/23/2020</a:t>
             </a:fld>
             <a:endParaRPr lang="en-US"/>
           </a:p>
@@ -2008,7 +2010,7 @@
           <a:p>
             <a:fld id="{59C95A8B-8514-44D8-B6AF-C67D600D4544}" type="datetimeFigureOut">
               <a:rPr lang="en-US" smtClean="0"/>
-              <a:t>1/25/2020</a:t>
+              <a:t>3/23/2020</a:t>
             </a:fld>
             <a:endParaRPr lang="en-US"/>
           </a:p>
@@ -2149,7 +2151,7 @@
           <a:p>
             <a:fld id="{59C95A8B-8514-44D8-B6AF-C67D600D4544}" type="datetimeFigureOut">
               <a:rPr lang="en-US" smtClean="0"/>
-              <a:t>1/25/2020</a:t>
+              <a:t>3/23/2020</a:t>
             </a:fld>
             <a:endParaRPr lang="en-US"/>
           </a:p>
@@ -2262,7 +2264,7 @@
           <a:p>
             <a:fld id="{59C95A8B-8514-44D8-B6AF-C67D600D4544}" type="datetimeFigureOut">
               <a:rPr lang="en-US" smtClean="0"/>
-              <a:t>1/25/2020</a:t>
+              <a:t>3/23/2020</a:t>
             </a:fld>
             <a:endParaRPr lang="en-US"/>
           </a:p>
@@ -2573,7 +2575,7 @@
           <a:p>
             <a:fld id="{59C95A8B-8514-44D8-B6AF-C67D600D4544}" type="datetimeFigureOut">
               <a:rPr lang="en-US" smtClean="0"/>
-              <a:t>1/25/2020</a:t>
+              <a:t>3/23/2020</a:t>
             </a:fld>
             <a:endParaRPr lang="en-US"/>
           </a:p>
@@ -2861,7 +2863,7 @@
           <a:p>
             <a:fld id="{59C95A8B-8514-44D8-B6AF-C67D600D4544}" type="datetimeFigureOut">
               <a:rPr lang="en-US" smtClean="0"/>
-              <a:t>1/25/2020</a:t>
+              <a:t>3/23/2020</a:t>
             </a:fld>
             <a:endParaRPr lang="en-US"/>
           </a:p>
@@ -3102,7 +3104,7 @@
           <a:p>
             <a:fld id="{59C95A8B-8514-44D8-B6AF-C67D600D4544}" type="datetimeFigureOut">
               <a:rPr lang="en-US" smtClean="0"/>
-              <a:t>1/25/2020</a:t>
+              <a:t>3/23/2020</a:t>
             </a:fld>
             <a:endParaRPr lang="en-US"/>
           </a:p>
@@ -3505,415 +3507,6 @@
 <file path=ppt/slides/slide1.xml><?xml version="1.0" encoding="utf-8"?>
 <p:sld xmlns:a="http://schemas.openxmlformats.org/drawingml/2006/main" xmlns:r="http://schemas.openxmlformats.org/officeDocument/2006/relationships" xmlns:p="http://schemas.openxmlformats.org/presentationml/2006/main">
   <p:cSld>
-    <p:bg>
-      <p:bgPr>
-        <a:solidFill>
-          <a:schemeClr val="bg1"/>
-        </a:solidFill>
-        <a:effectLst/>
-      </p:bgPr>
-    </p:bg>
-    <p:spTree>
-      <p:nvGrpSpPr>
-        <p:cNvPr id="1" name=""/>
-        <p:cNvGrpSpPr/>
-        <p:nvPr/>
-      </p:nvGrpSpPr>
-      <p:grpSpPr>
-        <a:xfrm>
-          <a:off x="0" y="0"/>
-          <a:ext cx="0" cy="0"/>
-          <a:chOff x="0" y="0"/>
-          <a:chExt cx="0" cy="0"/>
-        </a:xfrm>
-      </p:grpSpPr>
-      <p:cxnSp>
-        <p:nvCxnSpPr>
-          <p:cNvPr id="32" name="Straight Connector 31">
-            <a:extLst>
-              <a:ext uri="{FF2B5EF4-FFF2-40B4-BE49-F238E27FC236}">
-                <a16:creationId xmlns:a16="http://schemas.microsoft.com/office/drawing/2014/main" id="{D2E961F1-4A28-4A5F-BBD4-6E400E5E6C75}"/>
-              </a:ext>
-              <a:ext uri="{C183D7F6-B498-43B3-948B-1728B52AA6E4}">
-                <adec:decorative xmlns:adec="http://schemas.microsoft.com/office/drawing/2017/decorative" val="1"/>
-              </a:ext>
-            </a:extLst>
-          </p:cNvPr>
-          <p:cNvCxnSpPr>
-            <a:cxnSpLocks noGrp="1" noRot="1" noChangeAspect="1" noMove="1" noResize="1" noEditPoints="1" noAdjustHandles="1" noChangeArrowheads="1" noChangeShapeType="1"/>
-          </p:cNvCxnSpPr>
-          <p:nvPr>
-            <p:extLst>
-              <p:ext uri="{386F3935-93C4-4BCD-93E2-E3B085C9AB24}">
-                <p16:designElem xmlns:p16="http://schemas.microsoft.com/office/powerpoint/2015/main" val="1"/>
-              </p:ext>
-            </p:extLst>
-          </p:nvPr>
-        </p:nvCxnSpPr>
-        <p:spPr bwMode="white">
-          <a:xfrm>
-            <a:off x="0" y="272357"/>
-            <a:ext cx="12188824" cy="0"/>
-          </a:xfrm>
-          <a:prstGeom prst="line">
-            <a:avLst/>
-          </a:prstGeom>
-          <a:ln w="50800">
-            <a:solidFill>
-              <a:schemeClr val="tx1">
-                <a:lumMod val="75000"/>
-                <a:lumOff val="25000"/>
-              </a:schemeClr>
-            </a:solidFill>
-          </a:ln>
-        </p:spPr>
-        <p:style>
-          <a:lnRef idx="1">
-            <a:schemeClr val="accent1"/>
-          </a:lnRef>
-          <a:fillRef idx="0">
-            <a:schemeClr val="accent1"/>
-          </a:fillRef>
-          <a:effectRef idx="0">
-            <a:schemeClr val="accent1"/>
-          </a:effectRef>
-          <a:fontRef idx="minor">
-            <a:schemeClr val="tx1"/>
-          </a:fontRef>
-        </p:style>
-      </p:cxnSp>
-      <p:sp>
-        <p:nvSpPr>
-          <p:cNvPr id="34" name="Rectangle 33">
-            <a:extLst>
-              <a:ext uri="{FF2B5EF4-FFF2-40B4-BE49-F238E27FC236}">
-                <a16:creationId xmlns:a16="http://schemas.microsoft.com/office/drawing/2014/main" id="{7F57BEA8-497D-4AA8-8A18-BDCD696B25FE}"/>
-              </a:ext>
-              <a:ext uri="{C183D7F6-B498-43B3-948B-1728B52AA6E4}">
-                <adec:decorative xmlns:adec="http://schemas.microsoft.com/office/drawing/2017/decorative" val="1"/>
-              </a:ext>
-            </a:extLst>
-          </p:cNvPr>
-          <p:cNvSpPr>
-            <a:spLocks noGrp="1" noRot="1" noChangeAspect="1" noMove="1" noResize="1" noEditPoints="1" noAdjustHandles="1" noChangeArrowheads="1" noChangeShapeType="1" noTextEdit="1"/>
-          </p:cNvSpPr>
-          <p:nvPr>
-            <p:extLst>
-              <p:ext uri="{386F3935-93C4-4BCD-93E2-E3B085C9AB24}">
-                <p16:designElem xmlns:p16="http://schemas.microsoft.com/office/powerpoint/2015/main" val="1"/>
-              </p:ext>
-            </p:extLst>
-          </p:nvPr>
-        </p:nvSpPr>
-        <p:spPr>
-          <a:xfrm>
-            <a:off x="0" y="368596"/>
-            <a:ext cx="12192000" cy="1735555"/>
-          </a:xfrm>
-          <a:prstGeom prst="rect">
-            <a:avLst/>
-          </a:prstGeom>
-          <a:solidFill>
-            <a:schemeClr val="tx1">
-              <a:lumMod val="75000"/>
-              <a:lumOff val="25000"/>
-            </a:schemeClr>
-          </a:solidFill>
-          <a:ln>
-            <a:noFill/>
-          </a:ln>
-        </p:spPr>
-        <p:style>
-          <a:lnRef idx="2">
-            <a:schemeClr val="accent1">
-              <a:shade val="50000"/>
-            </a:schemeClr>
-          </a:lnRef>
-          <a:fillRef idx="1">
-            <a:schemeClr val="accent1"/>
-          </a:fillRef>
-          <a:effectRef idx="0">
-            <a:schemeClr val="accent1"/>
-          </a:effectRef>
-          <a:fontRef idx="minor">
-            <a:schemeClr val="lt1"/>
-          </a:fontRef>
-        </p:style>
-        <p:txBody>
-          <a:bodyPr rtlCol="0" anchor="ctr"/>
-          <a:lstStyle/>
-          <a:p>
-            <a:pPr algn="ctr"/>
-            <a:endParaRPr lang="en-US"/>
-          </a:p>
-        </p:txBody>
-      </p:sp>
-      <p:sp>
-        <p:nvSpPr>
-          <p:cNvPr id="8" name="Title 7">
-            <a:extLst>
-              <a:ext uri="{FF2B5EF4-FFF2-40B4-BE49-F238E27FC236}">
-                <a16:creationId xmlns:a16="http://schemas.microsoft.com/office/drawing/2014/main" id="{2753AF81-4B83-44D8-AE04-F43B716F0670}"/>
-              </a:ext>
-            </a:extLst>
-          </p:cNvPr>
-          <p:cNvSpPr>
-            <a:spLocks noGrp="1"/>
-          </p:cNvSpPr>
-          <p:nvPr>
-            <p:ph type="ctrTitle"/>
-          </p:nvPr>
-        </p:nvSpPr>
-        <p:spPr>
-          <a:xfrm>
-            <a:off x="526073" y="489439"/>
-            <a:ext cx="11139854" cy="930447"/>
-          </a:xfrm>
-        </p:spPr>
-        <p:txBody>
-          <a:bodyPr>
-            <a:normAutofit/>
-          </a:bodyPr>
-          <a:lstStyle/>
-          <a:p>
-            <a:r>
-              <a:rPr lang="en-CA" dirty="0">
-                <a:solidFill>
-                  <a:schemeClr val="bg1"/>
-                </a:solidFill>
-                <a:latin typeface="+mn-lt"/>
-              </a:rPr>
-              <a:t>Exploring</a:t>
-            </a:r>
-            <a:r>
-              <a:rPr lang="en-CA" dirty="0">
-                <a:solidFill>
-                  <a:schemeClr val="bg1"/>
-                </a:solidFill>
-              </a:rPr>
-              <a:t> </a:t>
-            </a:r>
-            <a:r>
-              <a:rPr lang="en-CA" dirty="0" err="1">
-                <a:solidFill>
-                  <a:schemeClr val="bg1"/>
-                </a:solidFill>
-              </a:rPr>
-              <a:t>WebWindow</a:t>
-            </a:r>
-            <a:endParaRPr lang="en-US" dirty="0">
-              <a:solidFill>
-                <a:schemeClr val="bg1"/>
-              </a:solidFill>
-            </a:endParaRPr>
-          </a:p>
-        </p:txBody>
-      </p:sp>
-      <p:sp>
-        <p:nvSpPr>
-          <p:cNvPr id="9" name="Subtitle 8">
-            <a:extLst>
-              <a:ext uri="{FF2B5EF4-FFF2-40B4-BE49-F238E27FC236}">
-                <a16:creationId xmlns:a16="http://schemas.microsoft.com/office/drawing/2014/main" id="{D1557D5F-5989-46B3-BE6D-11649A6E7CF8}"/>
-              </a:ext>
-            </a:extLst>
-          </p:cNvPr>
-          <p:cNvSpPr>
-            <a:spLocks noGrp="1"/>
-          </p:cNvSpPr>
-          <p:nvPr>
-            <p:ph type="subTitle" idx="1"/>
-          </p:nvPr>
-        </p:nvSpPr>
-        <p:spPr>
-          <a:xfrm>
-            <a:off x="1524000" y="1548499"/>
-            <a:ext cx="9144000" cy="420001"/>
-          </a:xfrm>
-        </p:spPr>
-        <p:txBody>
-          <a:bodyPr>
-            <a:noAutofit/>
-          </a:bodyPr>
-          <a:lstStyle/>
-          <a:p>
-            <a:r>
-              <a:rPr lang="en-CA" sz="3600" dirty="0">
-                <a:solidFill>
-                  <a:srgbClr val="F6A322"/>
-                </a:solidFill>
-              </a:rPr>
-              <a:t>Episode #148</a:t>
-            </a:r>
-            <a:endParaRPr lang="en-US" sz="3600" dirty="0">
-              <a:solidFill>
-                <a:srgbClr val="F6A322"/>
-              </a:solidFill>
-            </a:endParaRPr>
-          </a:p>
-        </p:txBody>
-      </p:sp>
-      <p:cxnSp>
-        <p:nvCxnSpPr>
-          <p:cNvPr id="40" name="Straight Connector 35">
-            <a:extLst>
-              <a:ext uri="{FF2B5EF4-FFF2-40B4-BE49-F238E27FC236}">
-                <a16:creationId xmlns:a16="http://schemas.microsoft.com/office/drawing/2014/main" id="{A82415D3-DDE5-4D63-8CB3-23A5EC581B27}"/>
-              </a:ext>
-              <a:ext uri="{C183D7F6-B498-43B3-948B-1728B52AA6E4}">
-                <adec:decorative xmlns:adec="http://schemas.microsoft.com/office/drawing/2017/decorative" val="1"/>
-              </a:ext>
-            </a:extLst>
-          </p:cNvPr>
-          <p:cNvCxnSpPr>
-            <a:cxnSpLocks noGrp="1" noRot="1" noChangeAspect="1" noMove="1" noResize="1" noEditPoints="1" noAdjustHandles="1" noChangeArrowheads="1" noChangeShapeType="1"/>
-          </p:cNvCxnSpPr>
-          <p:nvPr>
-            <p:extLst>
-              <p:ext uri="{386F3935-93C4-4BCD-93E2-E3B085C9AB24}">
-                <p16:designElem xmlns:p16="http://schemas.microsoft.com/office/powerpoint/2015/main" val="1"/>
-              </p:ext>
-            </p:extLst>
-          </p:nvPr>
-        </p:nvCxnSpPr>
-        <p:spPr>
-          <a:xfrm>
-            <a:off x="4724400" y="1479733"/>
-            <a:ext cx="2743200" cy="0"/>
-          </a:xfrm>
-          <a:prstGeom prst="line">
-            <a:avLst/>
-          </a:prstGeom>
-          <a:ln w="19050">
-            <a:solidFill>
-              <a:schemeClr val="bg1">
-                <a:alpha val="75000"/>
-              </a:schemeClr>
-            </a:solidFill>
-          </a:ln>
-        </p:spPr>
-        <p:style>
-          <a:lnRef idx="1">
-            <a:schemeClr val="accent1"/>
-          </a:lnRef>
-          <a:fillRef idx="0">
-            <a:schemeClr val="accent1"/>
-          </a:fillRef>
-          <a:effectRef idx="0">
-            <a:schemeClr val="accent1"/>
-          </a:effectRef>
-          <a:fontRef idx="minor">
-            <a:schemeClr val="tx1"/>
-          </a:fontRef>
-        </p:style>
-      </p:cxnSp>
-      <p:cxnSp>
-        <p:nvCxnSpPr>
-          <p:cNvPr id="41" name="Straight Connector 37">
-            <a:extLst>
-              <a:ext uri="{FF2B5EF4-FFF2-40B4-BE49-F238E27FC236}">
-                <a16:creationId xmlns:a16="http://schemas.microsoft.com/office/drawing/2014/main" id="{AD7193FB-6AE6-4B3B-8F89-56B55DD63B4D}"/>
-              </a:ext>
-              <a:ext uri="{C183D7F6-B498-43B3-948B-1728B52AA6E4}">
-                <adec:decorative xmlns:adec="http://schemas.microsoft.com/office/drawing/2017/decorative" val="1"/>
-              </a:ext>
-            </a:extLst>
-          </p:cNvPr>
-          <p:cNvCxnSpPr>
-            <a:cxnSpLocks noGrp="1" noRot="1" noChangeAspect="1" noMove="1" noResize="1" noEditPoints="1" noAdjustHandles="1" noChangeArrowheads="1" noChangeShapeType="1"/>
-          </p:cNvCxnSpPr>
-          <p:nvPr>
-            <p:extLst>
-              <p:ext uri="{386F3935-93C4-4BCD-93E2-E3B085C9AB24}">
-                <p16:designElem xmlns:p16="http://schemas.microsoft.com/office/powerpoint/2015/main" val="1"/>
-              </p:ext>
-            </p:extLst>
-          </p:nvPr>
-        </p:nvCxnSpPr>
-        <p:spPr bwMode="white">
-          <a:xfrm>
-            <a:off x="0" y="2201402"/>
-            <a:ext cx="12188824" cy="0"/>
-          </a:xfrm>
-          <a:prstGeom prst="line">
-            <a:avLst/>
-          </a:prstGeom>
-          <a:ln w="50800">
-            <a:solidFill>
-              <a:schemeClr val="tx1">
-                <a:lumMod val="75000"/>
-                <a:lumOff val="25000"/>
-              </a:schemeClr>
-            </a:solidFill>
-          </a:ln>
-        </p:spPr>
-        <p:style>
-          <a:lnRef idx="1">
-            <a:schemeClr val="accent1"/>
-          </a:lnRef>
-          <a:fillRef idx="0">
-            <a:schemeClr val="accent1"/>
-          </a:fillRef>
-          <a:effectRef idx="0">
-            <a:schemeClr val="accent1"/>
-          </a:effectRef>
-          <a:fontRef idx="minor">
-            <a:schemeClr val="tx1"/>
-          </a:fontRef>
-        </p:style>
-      </p:cxnSp>
-      <p:pic>
-        <p:nvPicPr>
-          <p:cNvPr id="5" name="Picture 4" descr="A picture containing toy, doll, cake, food&#10;&#10;Description automatically generated">
-            <a:extLst>
-              <a:ext uri="{FF2B5EF4-FFF2-40B4-BE49-F238E27FC236}">
-                <a16:creationId xmlns:a16="http://schemas.microsoft.com/office/drawing/2014/main" id="{F2A48C10-6484-4B9A-8FCD-1CFABF707E0B}"/>
-              </a:ext>
-            </a:extLst>
-          </p:cNvPr>
-          <p:cNvPicPr>
-            <a:picLocks noChangeAspect="1"/>
-          </p:cNvPicPr>
-          <p:nvPr/>
-        </p:nvPicPr>
-        <p:blipFill>
-          <a:blip r:embed="rId2">
-            <a:extLst>
-              <a:ext uri="{28A0092B-C50C-407E-A947-70E740481C1C}">
-                <a14:useLocalDpi xmlns:a14="http://schemas.microsoft.com/office/drawing/2010/main" val="0"/>
-              </a:ext>
-            </a:extLst>
-          </a:blip>
-          <a:stretch>
-            <a:fillRect/>
-          </a:stretch>
-        </p:blipFill>
-        <p:spPr>
-          <a:xfrm>
-            <a:off x="3389789" y="3085486"/>
-            <a:ext cx="5409246" cy="3367256"/>
-          </a:xfrm>
-          <a:prstGeom prst="rect">
-            <a:avLst/>
-          </a:prstGeom>
-        </p:spPr>
-      </p:pic>
-    </p:spTree>
-    <p:extLst>
-      <p:ext uri="{BB962C8B-B14F-4D97-AF65-F5344CB8AC3E}">
-        <p14:creationId xmlns:p14="http://schemas.microsoft.com/office/powerpoint/2010/main" val="3918733122"/>
-      </p:ext>
-    </p:extLst>
-  </p:cSld>
-  <p:clrMapOvr>
-    <a:masterClrMapping/>
-  </p:clrMapOvr>
-</p:sld>
-</file>
-
-<file path=ppt/slides/slide2.xml><?xml version="1.0" encoding="utf-8"?>
-<p:sld xmlns:a="http://schemas.openxmlformats.org/drawingml/2006/main" xmlns:r="http://schemas.openxmlformats.org/officeDocument/2006/relationships" xmlns:p="http://schemas.openxmlformats.org/presentationml/2006/main">
-  <p:cSld>
     <p:spTree>
       <p:nvGrpSpPr>
         <p:cNvPr id="1" name=""/>
@@ -4136,8 +3729,8 @@
           </a:prstGeom>
         </p:spPr>
         <p:txBody>
-          <a:bodyPr>
-            <a:normAutofit lnSpcReduction="10000"/>
+          <a:bodyPr anchor="ctr">
+            <a:normAutofit/>
           </a:bodyPr>
           <a:lstStyle>
             <a:lvl1pPr algn="l" defTabSz="914400" rtl="0" eaLnBrk="1" latinLnBrk="0" hangingPunct="1">
@@ -4161,37 +3754,14 @@
           <a:p>
             <a:pPr algn="ctr"/>
             <a:r>
-              <a:rPr lang="en-CA" sz="4800" dirty="0">
+              <a:rPr lang="en-US" sz="6000" dirty="0">
                 <a:solidFill>
                   <a:schemeClr val="bg1"/>
                 </a:solidFill>
                 <a:latin typeface="+mn-lt"/>
               </a:rPr>
-              <a:t>Parsing Command Line Arguments </a:t>
-            </a:r>
-            <a:br>
-              <a:rPr lang="en-CA" sz="4800" dirty="0">
-                <a:solidFill>
-                  <a:schemeClr val="bg1"/>
-                </a:solidFill>
-                <a:latin typeface="+mn-lt"/>
-              </a:rPr>
-            </a:br>
-            <a:r>
-              <a:rPr lang="en-CA" sz="4800" dirty="0">
-                <a:solidFill>
-                  <a:schemeClr val="bg1"/>
-                </a:solidFill>
-                <a:latin typeface="+mn-lt"/>
-              </a:rPr>
-              <a:t>in .NET Core</a:t>
-            </a:r>
-            <a:endParaRPr lang="en-US" sz="4800" dirty="0">
-              <a:solidFill>
-                <a:schemeClr val="bg1"/>
-              </a:solidFill>
-              <a:latin typeface="+mn-lt"/>
-            </a:endParaRPr>
+              <a:t>C# 8 – Default Implementations</a:t>
+            </a:r>
           </a:p>
         </p:txBody>
       </p:sp>
@@ -4396,7 +3966,7 @@
                   <a:srgbClr val="F6A322"/>
                 </a:solidFill>
               </a:rPr>
-              <a:t>Episode #144</a:t>
+              <a:t>Episode #157</a:t>
             </a:r>
             <a:endParaRPr lang="en-US" sz="4000" dirty="0">
               <a:solidFill>

</xml_diff>